<commit_message>
before pdf and png script
</commit_message>
<xml_diff>
--- a/report/Presentation.pptx
+++ b/report/Presentation.pptx
@@ -13,18 +13,24 @@
     <p:sldId id="263" r:id="rId7"/>
     <p:sldId id="264" r:id="rId8"/>
     <p:sldId id="265" r:id="rId9"/>
-    <p:sldId id="266" r:id="rId10"/>
-    <p:sldId id="267" r:id="rId11"/>
-    <p:sldId id="269" r:id="rId12"/>
-    <p:sldId id="268" r:id="rId13"/>
-    <p:sldId id="277" r:id="rId14"/>
-    <p:sldId id="270" r:id="rId15"/>
-    <p:sldId id="271" r:id="rId16"/>
-    <p:sldId id="273" r:id="rId17"/>
-    <p:sldId id="272" r:id="rId18"/>
-    <p:sldId id="274" r:id="rId19"/>
-    <p:sldId id="275" r:id="rId20"/>
-    <p:sldId id="276" r:id="rId21"/>
+    <p:sldId id="283" r:id="rId10"/>
+    <p:sldId id="266" r:id="rId11"/>
+    <p:sldId id="267" r:id="rId12"/>
+    <p:sldId id="269" r:id="rId13"/>
+    <p:sldId id="268" r:id="rId14"/>
+    <p:sldId id="277" r:id="rId15"/>
+    <p:sldId id="278" r:id="rId16"/>
+    <p:sldId id="279" r:id="rId17"/>
+    <p:sldId id="280" r:id="rId18"/>
+    <p:sldId id="281" r:id="rId19"/>
+    <p:sldId id="270" r:id="rId20"/>
+    <p:sldId id="271" r:id="rId21"/>
+    <p:sldId id="273" r:id="rId22"/>
+    <p:sldId id="282" r:id="rId23"/>
+    <p:sldId id="272" r:id="rId24"/>
+    <p:sldId id="274" r:id="rId25"/>
+    <p:sldId id="275" r:id="rId26"/>
+    <p:sldId id="276" r:id="rId27"/>
   </p:sldIdLst>
   <p:sldSz cx="9144000" cy="6858000" type="screen4x3"/>
   <p:notesSz cx="6858000" cy="9144000"/>
@@ -3279,6 +3285,85 @@
           <a:p>
             <a:r>
               <a:rPr lang="en-GB" dirty="0" smtClean="0"/>
+              <a:t>Our Framework</a:t>
+            </a:r>
+            <a:endParaRPr lang="en-GB" dirty="0"/>
+          </a:p>
+        </p:txBody>
+      </p:sp>
+      <p:sp>
+        <p:nvSpPr>
+          <p:cNvPr id="3" name="Content Placeholder 2"/>
+          <p:cNvSpPr>
+            <a:spLocks noGrp="1"/>
+          </p:cNvSpPr>
+          <p:nvPr>
+            <p:ph idx="1"/>
+          </p:nvPr>
+        </p:nvSpPr>
+        <p:spPr/>
+        <p:txBody>
+          <a:bodyPr/>
+          <a:lstStyle/>
+          <a:p>
+            <a:endParaRPr lang="en-GB" dirty="0"/>
+          </a:p>
+        </p:txBody>
+      </p:sp>
+    </p:spTree>
+    <p:extLst>
+      <p:ext uri="{BB962C8B-B14F-4D97-AF65-F5344CB8AC3E}">
+        <p14:creationId xmlns:p14="http://schemas.microsoft.com/office/powerpoint/2010/main" val="2036134894"/>
+      </p:ext>
+    </p:extLst>
+  </p:cSld>
+  <p:clrMapOvr>
+    <a:masterClrMapping/>
+  </p:clrMapOvr>
+  <p:timing>
+    <p:tnLst>
+      <p:par>
+        <p:cTn id="1" dur="indefinite" restart="never" nodeType="tmRoot"/>
+      </p:par>
+    </p:tnLst>
+  </p:timing>
+</p:sld>
+</file>
+
+<file path=ppt/slides/slide11.xml><?xml version="1.0" encoding="utf-8"?>
+<p:sld xmlns:a="http://schemas.openxmlformats.org/drawingml/2006/main" xmlns:r="http://schemas.openxmlformats.org/officeDocument/2006/relationships" xmlns:p="http://schemas.openxmlformats.org/presentationml/2006/main">
+  <p:cSld>
+    <p:spTree>
+      <p:nvGrpSpPr>
+        <p:cNvPr id="1" name=""/>
+        <p:cNvGrpSpPr/>
+        <p:nvPr/>
+      </p:nvGrpSpPr>
+      <p:grpSpPr>
+        <a:xfrm>
+          <a:off x="0" y="0"/>
+          <a:ext cx="0" cy="0"/>
+          <a:chOff x="0" y="0"/>
+          <a:chExt cx="0" cy="0"/>
+        </a:xfrm>
+      </p:grpSpPr>
+      <p:sp>
+        <p:nvSpPr>
+          <p:cNvPr id="2" name="Title 1"/>
+          <p:cNvSpPr>
+            <a:spLocks noGrp="1"/>
+          </p:cNvSpPr>
+          <p:nvPr>
+            <p:ph type="title"/>
+          </p:nvPr>
+        </p:nvSpPr>
+        <p:spPr/>
+        <p:txBody>
+          <a:bodyPr/>
+          <a:lstStyle/>
+          <a:p>
+            <a:r>
+              <a:rPr lang="en-GB" dirty="0" smtClean="0"/>
               <a:t>Implementation</a:t>
             </a:r>
             <a:endParaRPr lang="en-GB" dirty="0"/>
@@ -3418,152 +3503,6 @@
 </p:sld>
 </file>
 
-<file path=ppt/slides/slide11.xml><?xml version="1.0" encoding="utf-8"?>
-<p:sld xmlns:a="http://schemas.openxmlformats.org/drawingml/2006/main" xmlns:r="http://schemas.openxmlformats.org/officeDocument/2006/relationships" xmlns:p="http://schemas.openxmlformats.org/presentationml/2006/main">
-  <p:cSld>
-    <p:spTree>
-      <p:nvGrpSpPr>
-        <p:cNvPr id="1" name=""/>
-        <p:cNvGrpSpPr/>
-        <p:nvPr/>
-      </p:nvGrpSpPr>
-      <p:grpSpPr>
-        <a:xfrm>
-          <a:off x="0" y="0"/>
-          <a:ext cx="0" cy="0"/>
-          <a:chOff x="0" y="0"/>
-          <a:chExt cx="0" cy="0"/>
-        </a:xfrm>
-      </p:grpSpPr>
-      <p:sp>
-        <p:nvSpPr>
-          <p:cNvPr id="2" name="Title 1"/>
-          <p:cNvSpPr>
-            <a:spLocks noGrp="1"/>
-          </p:cNvSpPr>
-          <p:nvPr>
-            <p:ph type="title"/>
-          </p:nvPr>
-        </p:nvSpPr>
-        <p:spPr/>
-        <p:txBody>
-          <a:bodyPr/>
-          <a:lstStyle/>
-          <a:p>
-            <a:r>
-              <a:rPr lang="en-GB" dirty="0" smtClean="0"/>
-              <a:t>Operation Memory </a:t>
-            </a:r>
-            <a:r>
-              <a:rPr lang="en-GB" dirty="0"/>
-              <a:t>A</a:t>
-            </a:r>
-            <a:r>
-              <a:rPr lang="en-GB" dirty="0" smtClean="0"/>
-              <a:t>ccess</a:t>
-            </a:r>
-            <a:endParaRPr lang="en-GB" dirty="0"/>
-          </a:p>
-        </p:txBody>
-      </p:sp>
-      <p:sp>
-        <p:nvSpPr>
-          <p:cNvPr id="3" name="Content Placeholder 2"/>
-          <p:cNvSpPr>
-            <a:spLocks noGrp="1"/>
-          </p:cNvSpPr>
-          <p:nvPr>
-            <p:ph idx="1"/>
-          </p:nvPr>
-        </p:nvSpPr>
-        <p:spPr/>
-        <p:txBody>
-          <a:bodyPr/>
-          <a:lstStyle/>
-          <a:p>
-            <a:r>
-              <a:rPr lang="en-GB" dirty="0" smtClean="0"/>
-              <a:t>2 versions of each operator</a:t>
-            </a:r>
-          </a:p>
-          <a:p>
-            <a:r>
-              <a:rPr lang="en-GB" dirty="0" smtClean="0"/>
-              <a:t>Differ in operand addressing</a:t>
-            </a:r>
-          </a:p>
-          <a:p>
-            <a:pPr lvl="1"/>
-            <a:r>
-              <a:rPr lang="en-GB" dirty="0" smtClean="0"/>
-              <a:t>“global” operator: expects data to be in </a:t>
-            </a:r>
-            <a:r>
-              <a:rPr lang="en-GB" dirty="0" smtClean="0">
-                <a:solidFill>
-                  <a:srgbClr val="FF0000"/>
-                </a:solidFill>
-              </a:rPr>
-              <a:t>global</a:t>
-            </a:r>
-            <a:r>
-              <a:rPr lang="en-GB" dirty="0" smtClean="0"/>
-              <a:t> </a:t>
-            </a:r>
-            <a:r>
-              <a:rPr lang="en-GB" dirty="0" smtClean="0">
-                <a:solidFill>
-                  <a:srgbClr val="FF0000"/>
-                </a:solidFill>
-              </a:rPr>
-              <a:t>coalesced</a:t>
-            </a:r>
-            <a:r>
-              <a:rPr lang="en-GB" dirty="0" smtClean="0"/>
-              <a:t> memory</a:t>
-            </a:r>
-          </a:p>
-          <a:p>
-            <a:pPr lvl="1"/>
-            <a:r>
-              <a:rPr lang="en-GB" dirty="0" smtClean="0"/>
-              <a:t>“local” operator: expects data to be in </a:t>
-            </a:r>
-            <a:r>
-              <a:rPr lang="en-GB" dirty="0" smtClean="0">
-                <a:solidFill>
-                  <a:srgbClr val="FF0000"/>
-                </a:solidFill>
-              </a:rPr>
-              <a:t>local non-coalesced </a:t>
-            </a:r>
-            <a:r>
-              <a:rPr lang="en-GB" dirty="0" smtClean="0"/>
-              <a:t>memory</a:t>
-            </a:r>
-          </a:p>
-        </p:txBody>
-      </p:sp>
-    </p:spTree>
-    <p:extLst>
-      <p:ext uri="{BB962C8B-B14F-4D97-AF65-F5344CB8AC3E}">
-        <p14:creationId xmlns:p14="http://schemas.microsoft.com/office/powerpoint/2010/main" val="819490721"/>
-      </p:ext>
-    </p:extLst>
-  </p:cSld>
-  <p:clrMapOvr>
-    <a:masterClrMapping/>
-  </p:clrMapOvr>
-  <p:timing>
-    <p:tnLst>
-      <p:par>
-        <p:cTn id="1" dur="indefinite" restart="never" nodeType="tmRoot"/>
-      </p:par>
-    </p:tnLst>
-  </p:timing>
-</p:sld>
-</file>
-
 <file path=ppt/slides/slide12.xml><?xml version="1.0" encoding="utf-8"?>
 <p:sld xmlns:a="http://schemas.openxmlformats.org/drawingml/2006/main" xmlns:r="http://schemas.openxmlformats.org/officeDocument/2006/relationships" xmlns:p="http://schemas.openxmlformats.org/presentationml/2006/main">
   <p:cSld>
@@ -3598,7 +3537,15 @@
           <a:p>
             <a:r>
               <a:rPr lang="en-GB" dirty="0" smtClean="0"/>
-              <a:t>Implemented Operations</a:t>
+              <a:t>Operation Memory </a:t>
+            </a:r>
+            <a:r>
+              <a:rPr lang="en-GB" dirty="0"/>
+              <a:t>A</a:t>
+            </a:r>
+            <a:r>
+              <a:rPr lang="en-GB" dirty="0" smtClean="0"/>
+              <a:t>ccess</a:t>
             </a:r>
             <a:endParaRPr lang="en-GB" dirty="0"/>
           </a:p>
@@ -3621,56 +3568,71 @@
           <a:p>
             <a:r>
               <a:rPr lang="en-GB" dirty="0" smtClean="0"/>
-              <a:t>Addition</a:t>
-            </a:r>
-          </a:p>
-          <a:p>
-            <a:r>
-              <a:rPr lang="en-GB" dirty="0" smtClean="0"/>
-              <a:t>Subtraction</a:t>
-            </a:r>
-          </a:p>
-          <a:p>
-            <a:r>
-              <a:rPr lang="en-GB" dirty="0" smtClean="0"/>
-              <a:t>Multiplication</a:t>
-            </a:r>
-          </a:p>
-          <a:p>
-            <a:r>
-              <a:rPr lang="en-GB" dirty="0" err="1" smtClean="0"/>
-              <a:t>Karatsuba</a:t>
-            </a:r>
-            <a:r>
-              <a:rPr lang="en-GB" dirty="0" smtClean="0"/>
-              <a:t> Multiplication (1-level)</a:t>
-            </a:r>
-          </a:p>
-          <a:p>
-            <a:r>
-              <a:rPr lang="en-GB" dirty="0" smtClean="0"/>
-              <a:t>Modular Addition</a:t>
-            </a:r>
-          </a:p>
-          <a:p>
-            <a:r>
-              <a:rPr lang="en-GB" dirty="0" smtClean="0"/>
-              <a:t>Modular Subtraction</a:t>
-            </a:r>
-          </a:p>
-          <a:p>
-            <a:r>
-              <a:rPr lang="en-GB" dirty="0" smtClean="0"/>
-              <a:t>Montgomery Reduction*</a:t>
-            </a:r>
-            <a:endParaRPr lang="en-GB" dirty="0"/>
+              <a:t>2 versions of each operator</a:t>
+            </a:r>
+          </a:p>
+          <a:p>
+            <a:r>
+              <a:rPr lang="en-GB" dirty="0" smtClean="0"/>
+              <a:t>Differ in operand addressing</a:t>
+            </a:r>
+          </a:p>
+          <a:p>
+            <a:pPr lvl="1"/>
+            <a:r>
+              <a:rPr lang="en-GB" dirty="0" smtClean="0"/>
+              <a:t>“global” operator: expects data to be in </a:t>
+            </a:r>
+            <a:r>
+              <a:rPr lang="en-GB" dirty="0" smtClean="0">
+                <a:solidFill>
+                  <a:srgbClr val="FF0000"/>
+                </a:solidFill>
+              </a:rPr>
+              <a:t>global</a:t>
+            </a:r>
+            <a:r>
+              <a:rPr lang="en-GB" dirty="0" smtClean="0"/>
+              <a:t> </a:t>
+            </a:r>
+            <a:r>
+              <a:rPr lang="en-GB" dirty="0" smtClean="0">
+                <a:solidFill>
+                  <a:srgbClr val="FF0000"/>
+                </a:solidFill>
+              </a:rPr>
+              <a:t>coalesced</a:t>
+            </a:r>
+            <a:r>
+              <a:rPr lang="en-GB" dirty="0" smtClean="0"/>
+              <a:t> memory</a:t>
+            </a:r>
+          </a:p>
+          <a:p>
+            <a:pPr lvl="1"/>
+            <a:r>
+              <a:rPr lang="en-GB" dirty="0" smtClean="0"/>
+              <a:t>“local” operator: expects data to be in </a:t>
+            </a:r>
+            <a:r>
+              <a:rPr lang="en-GB" dirty="0" smtClean="0">
+                <a:solidFill>
+                  <a:srgbClr val="FF0000"/>
+                </a:solidFill>
+              </a:rPr>
+              <a:t>local non-coalesced </a:t>
+            </a:r>
+            <a:r>
+              <a:rPr lang="en-GB" dirty="0" smtClean="0"/>
+              <a:t>memory</a:t>
+            </a:r>
           </a:p>
         </p:txBody>
       </p:sp>
     </p:spTree>
     <p:extLst>
       <p:ext uri="{BB962C8B-B14F-4D97-AF65-F5344CB8AC3E}">
-        <p14:creationId xmlns:p14="http://schemas.microsoft.com/office/powerpoint/2010/main" val="3625645512"/>
+        <p14:creationId xmlns:p14="http://schemas.microsoft.com/office/powerpoint/2010/main" val="819490721"/>
       </p:ext>
     </p:extLst>
   </p:cSld>
@@ -3720,42 +3682,93 @@
           <a:lstStyle/>
           <a:p>
             <a:r>
-              <a:rPr lang="en-GB" smtClean="0"/>
+              <a:rPr lang="en-GB" dirty="0" smtClean="0"/>
+              <a:t>Implemented Operations</a:t>
+            </a:r>
+            <a:endParaRPr lang="en-GB" dirty="0"/>
+          </a:p>
+        </p:txBody>
+      </p:sp>
+      <p:sp>
+        <p:nvSpPr>
+          <p:cNvPr id="3" name="Content Placeholder 2"/>
+          <p:cNvSpPr>
+            <a:spLocks noGrp="1"/>
+          </p:cNvSpPr>
+          <p:nvPr>
+            <p:ph idx="1"/>
+          </p:nvPr>
+        </p:nvSpPr>
+        <p:spPr/>
+        <p:txBody>
+          <a:bodyPr/>
+          <a:lstStyle/>
+          <a:p>
+            <a:r>
+              <a:rPr lang="en-GB" dirty="0" smtClean="0"/>
               <a:t>Addition</a:t>
             </a:r>
+          </a:p>
+          <a:p>
+            <a:r>
+              <a:rPr lang="en-GB" dirty="0" smtClean="0"/>
+              <a:t>Subtraction</a:t>
+            </a:r>
+          </a:p>
+          <a:p>
+            <a:r>
+              <a:rPr lang="en-GB" dirty="0" smtClean="0"/>
+              <a:t>Multiplication</a:t>
+            </a:r>
+          </a:p>
+          <a:p>
+            <a:r>
+              <a:rPr lang="en-GB" dirty="0" err="1" smtClean="0"/>
+              <a:t>Karatsuba</a:t>
+            </a:r>
+            <a:r>
+              <a:rPr lang="en-GB" dirty="0" smtClean="0"/>
+              <a:t> Multiplication (1-level)</a:t>
+            </a:r>
+          </a:p>
+          <a:p>
+            <a:r>
+              <a:rPr lang="en-GB" dirty="0" smtClean="0"/>
+              <a:t>Modular Addition</a:t>
+            </a:r>
+          </a:p>
+          <a:p>
+            <a:r>
+              <a:rPr lang="en-GB" dirty="0" smtClean="0"/>
+              <a:t>Modular Subtraction</a:t>
+            </a:r>
+          </a:p>
+          <a:p>
+            <a:r>
+              <a:rPr lang="en-GB" dirty="0" smtClean="0"/>
+              <a:t>Montgomery Reduction*</a:t>
+            </a:r>
             <a:endParaRPr lang="en-GB" dirty="0"/>
-          </a:p>
-        </p:txBody>
-      </p:sp>
-      <p:sp>
-        <p:nvSpPr>
-          <p:cNvPr id="3" name="Content Placeholder 2"/>
-          <p:cNvSpPr>
-            <a:spLocks noGrp="1"/>
-          </p:cNvSpPr>
-          <p:nvPr>
-            <p:ph idx="1"/>
-          </p:nvPr>
-        </p:nvSpPr>
-        <p:spPr/>
-        <p:txBody>
-          <a:bodyPr/>
-          <a:lstStyle/>
-          <a:p>
-            <a:endParaRPr lang="en-GB"/>
           </a:p>
         </p:txBody>
       </p:sp>
     </p:spTree>
     <p:extLst>
       <p:ext uri="{BB962C8B-B14F-4D97-AF65-F5344CB8AC3E}">
-        <p14:creationId xmlns:p14="http://schemas.microsoft.com/office/powerpoint/2010/main" val="3241981569"/>
+        <p14:creationId xmlns:p14="http://schemas.microsoft.com/office/powerpoint/2010/main" val="3625645512"/>
       </p:ext>
     </p:extLst>
   </p:cSld>
   <p:clrMapOvr>
     <a:masterClrMapping/>
   </p:clrMapOvr>
+  <p:timing>
+    <p:tnLst>
+      <p:par>
+        <p:cTn id="1" dur="indefinite" restart="never" nodeType="tmRoot"/>
+      </p:par>
+    </p:tnLst>
+  </p:timing>
 </p:sld>
 </file>
 
@@ -3793,35 +3806,45 @@
           <a:p>
             <a:r>
               <a:rPr lang="en-GB" dirty="0" smtClean="0"/>
-              <a:t>Benchmark Infrastructure</a:t>
+              <a:t>Addition / Subtraction</a:t>
             </a:r>
             <a:endParaRPr lang="en-GB" dirty="0"/>
           </a:p>
         </p:txBody>
       </p:sp>
-      <p:sp>
-        <p:nvSpPr>
-          <p:cNvPr id="3" name="Content Placeholder 2"/>
-          <p:cNvSpPr>
-            <a:spLocks noGrp="1"/>
-          </p:cNvSpPr>
+      <p:pic>
+        <p:nvPicPr>
+          <p:cNvPr id="4" name="Content Placeholder 3"/>
+          <p:cNvPicPr>
+            <a:picLocks noGrp="1" noChangeAspect="1"/>
+          </p:cNvPicPr>
           <p:nvPr>
             <p:ph idx="1"/>
           </p:nvPr>
-        </p:nvSpPr>
-        <p:spPr/>
-        <p:txBody>
-          <a:bodyPr/>
-          <a:lstStyle/>
-          <a:p>
-            <a:endParaRPr lang="en-GB" dirty="0"/>
-          </a:p>
-        </p:txBody>
-      </p:sp>
+        </p:nvPicPr>
+        <p:blipFill>
+          <a:blip r:embed="rId2">
+            <a:extLst>
+              <a:ext uri="{28A0092B-C50C-407E-A947-70E740481C1C}">
+                <a14:useLocalDpi xmlns:a14="http://schemas.microsoft.com/office/drawing/2010/main" val="0"/>
+              </a:ext>
+            </a:extLst>
+          </a:blip>
+          <a:stretch>
+            <a:fillRect/>
+          </a:stretch>
+        </p:blipFill>
+        <p:spPr>
+          <a:xfrm>
+            <a:off x="457200" y="2950472"/>
+            <a:ext cx="8229600" cy="1825419"/>
+          </a:xfrm>
+        </p:spPr>
+      </p:pic>
     </p:spTree>
     <p:extLst>
       <p:ext uri="{BB962C8B-B14F-4D97-AF65-F5344CB8AC3E}">
-        <p14:creationId xmlns:p14="http://schemas.microsoft.com/office/powerpoint/2010/main" val="1262940810"/>
+        <p14:creationId xmlns:p14="http://schemas.microsoft.com/office/powerpoint/2010/main" val="3241981569"/>
       </p:ext>
     </p:extLst>
   </p:cSld>
@@ -3872,92 +3895,75 @@
           <a:p>
             <a:r>
               <a:rPr lang="en-GB" dirty="0" smtClean="0"/>
-              <a:t>Benchmark Results</a:t>
+              <a:t>Multiplication</a:t>
             </a:r>
             <a:endParaRPr lang="en-GB" dirty="0"/>
           </a:p>
         </p:txBody>
       </p:sp>
-      <p:sp>
-        <p:nvSpPr>
-          <p:cNvPr id="3" name="Content Placeholder 2"/>
-          <p:cNvSpPr>
-            <a:spLocks noGrp="1"/>
-          </p:cNvSpPr>
+      <p:pic>
+        <p:nvPicPr>
+          <p:cNvPr id="4" name="Content Placeholder 3"/>
+          <p:cNvPicPr>
+            <a:picLocks noGrp="1" noChangeAspect="1"/>
+          </p:cNvPicPr>
           <p:nvPr>
             <p:ph idx="1"/>
           </p:nvPr>
-        </p:nvSpPr>
-        <p:spPr/>
-        <p:txBody>
-          <a:bodyPr/>
-          <a:lstStyle/>
-          <a:p>
-            <a:r>
-              <a:rPr lang="en-GB" dirty="0" smtClean="0"/>
-              <a:t>Benchmarks involve 10 consecutive executions of an algorithm.</a:t>
-            </a:r>
-          </a:p>
-          <a:p>
-            <a:r>
-              <a:rPr lang="en-GB" dirty="0" smtClean="0"/>
-              <a:t>Types of benchmarks</a:t>
-            </a:r>
-          </a:p>
-          <a:p>
-            <a:pPr lvl="1"/>
-            <a:r>
-              <a:rPr lang="en-GB" dirty="0" smtClean="0"/>
-              <a:t>Local vs. global memory access</a:t>
-            </a:r>
-          </a:p>
-          <a:p>
-            <a:pPr lvl="1"/>
-            <a:r>
-              <a:rPr lang="en-GB" dirty="0" smtClean="0"/>
-              <a:t>Importance of operand layout in memory</a:t>
-            </a:r>
-          </a:p>
-          <a:p>
-            <a:pPr lvl="1"/>
-            <a:r>
-              <a:rPr lang="en-GB" dirty="0" smtClean="0"/>
-              <a:t>Classical vs. </a:t>
-            </a:r>
-            <a:r>
-              <a:rPr lang="en-GB" dirty="0" err="1" smtClean="0"/>
-              <a:t>Karatsuba</a:t>
-            </a:r>
-            <a:r>
-              <a:rPr lang="en-GB" dirty="0" smtClean="0"/>
-              <a:t> multiplication</a:t>
-            </a:r>
-          </a:p>
-          <a:p>
-            <a:pPr lvl="1"/>
-            <a:r>
-              <a:rPr lang="en-GB" dirty="0" err="1" smtClean="0"/>
-              <a:t>Kepler</a:t>
-            </a:r>
-            <a:r>
-              <a:rPr lang="en-GB" dirty="0" smtClean="0"/>
-              <a:t> vs. Fermi</a:t>
-            </a:r>
-          </a:p>
-          <a:p>
-            <a:pPr lvl="1"/>
-            <a:r>
-              <a:rPr lang="en-GB" dirty="0" smtClean="0"/>
-              <a:t>Warp occupation</a:t>
-            </a:r>
-            <a:endParaRPr lang="en-GB" dirty="0"/>
-          </a:p>
-        </p:txBody>
-      </p:sp>
+        </p:nvPicPr>
+        <p:blipFill>
+          <a:blip r:embed="rId2">
+            <a:extLst>
+              <a:ext uri="{28A0092B-C50C-407E-A947-70E740481C1C}">
+                <a14:useLocalDpi xmlns:a14="http://schemas.microsoft.com/office/drawing/2010/main" val="0"/>
+              </a:ext>
+            </a:extLst>
+          </a:blip>
+          <a:stretch>
+            <a:fillRect/>
+          </a:stretch>
+        </p:blipFill>
+        <p:spPr>
+          <a:xfrm>
+            <a:off x="1547664" y="1276759"/>
+            <a:ext cx="2592288" cy="5392600"/>
+          </a:xfrm>
+        </p:spPr>
+      </p:pic>
+      <p:pic>
+        <p:nvPicPr>
+          <p:cNvPr id="5" name="Picture 4"/>
+          <p:cNvPicPr>
+            <a:picLocks noChangeAspect="1"/>
+          </p:cNvPicPr>
+          <p:nvPr/>
+        </p:nvPicPr>
+        <p:blipFill>
+          <a:blip r:embed="rId3">
+            <a:extLst>
+              <a:ext uri="{28A0092B-C50C-407E-A947-70E740481C1C}">
+                <a14:useLocalDpi xmlns:a14="http://schemas.microsoft.com/office/drawing/2010/main" val="0"/>
+              </a:ext>
+            </a:extLst>
+          </a:blip>
+          <a:stretch>
+            <a:fillRect/>
+          </a:stretch>
+        </p:blipFill>
+        <p:spPr>
+          <a:xfrm>
+            <a:off x="4644008" y="1265202"/>
+            <a:ext cx="2597844" cy="5404157"/>
+          </a:xfrm>
+          <a:prstGeom prst="rect">
+            <a:avLst/>
+          </a:prstGeom>
+        </p:spPr>
+      </p:pic>
     </p:spTree>
     <p:extLst>
       <p:ext uri="{BB962C8B-B14F-4D97-AF65-F5344CB8AC3E}">
-        <p14:creationId xmlns:p14="http://schemas.microsoft.com/office/powerpoint/2010/main" val="3123424124"/>
+        <p14:creationId xmlns:p14="http://schemas.microsoft.com/office/powerpoint/2010/main" val="361341530"/>
       </p:ext>
     </p:extLst>
   </p:cSld>
@@ -4001,58 +4007,61 @@
             <p:ph type="title"/>
           </p:nvPr>
         </p:nvSpPr>
-        <p:spPr/>
-        <p:txBody>
-          <a:bodyPr/>
-          <a:lstStyle/>
-          <a:p>
-            <a:r>
-              <a:rPr lang="en-GB" dirty="0" smtClean="0"/>
-              <a:t>Warp Occupation Results</a:t>
+        <p:spPr>
+          <a:xfrm>
+            <a:off x="467544" y="-243408"/>
+            <a:ext cx="8229600" cy="1143000"/>
+          </a:xfrm>
+        </p:spPr>
+        <p:txBody>
+          <a:bodyPr/>
+          <a:lstStyle/>
+          <a:p>
+            <a:r>
+              <a:rPr lang="en-GB" dirty="0" err="1" smtClean="0"/>
+              <a:t>Karatsuba</a:t>
+            </a:r>
+            <a:r>
+              <a:rPr lang="en-GB" dirty="0" smtClean="0"/>
+              <a:t> Multiplication</a:t>
             </a:r>
             <a:endParaRPr lang="en-GB" dirty="0"/>
           </a:p>
         </p:txBody>
       </p:sp>
-      <p:sp>
-        <p:nvSpPr>
-          <p:cNvPr id="5" name="Content Placeholder 4"/>
-          <p:cNvSpPr>
-            <a:spLocks noGrp="1"/>
-          </p:cNvSpPr>
+      <p:pic>
+        <p:nvPicPr>
+          <p:cNvPr id="4" name="Content Placeholder 3"/>
+          <p:cNvPicPr>
+            <a:picLocks noGrp="1" noChangeAspect="1"/>
+          </p:cNvPicPr>
           <p:nvPr>
             <p:ph idx="1"/>
           </p:nvPr>
-        </p:nvSpPr>
-        <p:spPr/>
-        <p:txBody>
-          <a:bodyPr/>
-          <a:lstStyle/>
-          <a:p>
-            <a:r>
-              <a:rPr lang="en-GB" dirty="0" smtClean="0"/>
-              <a:t>Better to have less blocks, where more threads are used.</a:t>
-            </a:r>
-          </a:p>
-          <a:p>
-            <a:r>
-              <a:rPr lang="en-GB" dirty="0" smtClean="0"/>
-              <a:t>Must keep warp occupation full, at least 32 threads.</a:t>
-            </a:r>
-          </a:p>
-          <a:p>
-            <a:r>
-              <a:rPr lang="en-GB" dirty="0" smtClean="0"/>
-              <a:t>If not, then resources are wasted.</a:t>
-            </a:r>
-            <a:endParaRPr lang="en-GB" dirty="0"/>
-          </a:p>
-        </p:txBody>
-      </p:sp>
+        </p:nvPicPr>
+        <p:blipFill>
+          <a:blip r:embed="rId2">
+            <a:extLst>
+              <a:ext uri="{28A0092B-C50C-407E-A947-70E740481C1C}">
+                <a14:useLocalDpi xmlns:a14="http://schemas.microsoft.com/office/drawing/2010/main" val="0"/>
+              </a:ext>
+            </a:extLst>
+          </a:blip>
+          <a:stretch>
+            <a:fillRect/>
+          </a:stretch>
+        </p:blipFill>
+        <p:spPr>
+          <a:xfrm>
+            <a:off x="2411760" y="548680"/>
+            <a:ext cx="4320480" cy="6217277"/>
+          </a:xfrm>
+        </p:spPr>
+      </p:pic>
     </p:spTree>
     <p:extLst>
       <p:ext uri="{BB962C8B-B14F-4D97-AF65-F5344CB8AC3E}">
-        <p14:creationId xmlns:p14="http://schemas.microsoft.com/office/powerpoint/2010/main" val="1675382120"/>
+        <p14:creationId xmlns:p14="http://schemas.microsoft.com/office/powerpoint/2010/main" val="4065782745"/>
       </p:ext>
     </p:extLst>
   </p:cSld>
@@ -4086,6 +4095,36 @@
           <a:chExt cx="0" cy="0"/>
         </a:xfrm>
       </p:grpSpPr>
+      <p:pic>
+        <p:nvPicPr>
+          <p:cNvPr id="4" name="Picture 3"/>
+          <p:cNvPicPr>
+            <a:picLocks noChangeAspect="1"/>
+          </p:cNvPicPr>
+          <p:nvPr/>
+        </p:nvPicPr>
+        <p:blipFill>
+          <a:blip r:embed="rId2">
+            <a:extLst>
+              <a:ext uri="{28A0092B-C50C-407E-A947-70E740481C1C}">
+                <a14:useLocalDpi xmlns:a14="http://schemas.microsoft.com/office/drawing/2010/main" val="0"/>
+              </a:ext>
+            </a:extLst>
+          </a:blip>
+          <a:stretch>
+            <a:fillRect/>
+          </a:stretch>
+        </p:blipFill>
+        <p:spPr>
+          <a:xfrm>
+            <a:off x="72008" y="1556792"/>
+            <a:ext cx="8964488" cy="4549227"/>
+          </a:xfrm>
+          <a:prstGeom prst="rect">
+            <a:avLst/>
+          </a:prstGeom>
+        </p:spPr>
+      </p:pic>
       <p:sp>
         <p:nvSpPr>
           <p:cNvPr id="2" name="Title 1"/>
@@ -4103,7 +4142,7 @@
           <a:p>
             <a:r>
               <a:rPr lang="en-GB" dirty="0" smtClean="0"/>
-              <a:t>Operator verification</a:t>
+              <a:t>Modular Addition</a:t>
             </a:r>
             <a:endParaRPr lang="en-GB" dirty="0"/>
           </a:p>
@@ -4126,41 +4165,95 @@
           <a:p>
             <a:r>
               <a:rPr lang="en-GB" dirty="0" smtClean="0"/>
-              <a:t>Like benchmark infrastructure</a:t>
-            </a:r>
-          </a:p>
-          <a:p>
-            <a:r>
-              <a:rPr lang="en-GB" dirty="0" smtClean="0"/>
-              <a:t>Operation results recovered from server</a:t>
-            </a:r>
-          </a:p>
-          <a:p>
-            <a:r>
-              <a:rPr lang="en-GB" dirty="0" smtClean="0"/>
-              <a:t>Checked for errors with GMP on host</a:t>
-            </a:r>
+              <a:t>Hypothesis: a, </a:t>
+            </a:r>
+            <a:r>
+              <a:rPr lang="en-GB" dirty="0"/>
+              <a:t>b</a:t>
+            </a:r>
+            <a:r>
+              <a:rPr lang="en-GB" dirty="0" smtClean="0"/>
+              <a:t> &lt; m</a:t>
+            </a:r>
+          </a:p>
+          <a:p>
             <a:endParaRPr lang="en-GB" dirty="0"/>
+          </a:p>
+        </p:txBody>
+      </p:sp>
+      <p:sp>
+        <p:nvSpPr>
+          <p:cNvPr id="5" name="TextBox 4"/>
+          <p:cNvSpPr txBox="1"/>
+          <p:nvPr/>
+        </p:nvSpPr>
+        <p:spPr>
+          <a:xfrm>
+            <a:off x="5652120" y="4221088"/>
+            <a:ext cx="2490041" cy="1938992"/>
+          </a:xfrm>
+          <a:prstGeom prst="rect">
+            <a:avLst/>
+          </a:prstGeom>
+          <a:noFill/>
+        </p:spPr>
+        <p:txBody>
+          <a:bodyPr wrap="none" rtlCol="0">
+            <a:spAutoFit/>
+          </a:bodyPr>
+          <a:lstStyle/>
+          <a:p>
+            <a:r>
+              <a:rPr lang="en-GB" sz="2400" dirty="0" smtClean="0"/>
+              <a:t>c = a + b</a:t>
+            </a:r>
+          </a:p>
+          <a:p>
+            <a:r>
+              <a:rPr lang="en-GB" sz="2400" dirty="0"/>
+              <a:t>c</a:t>
+            </a:r>
+            <a:r>
+              <a:rPr lang="en-GB" sz="2400" dirty="0" smtClean="0"/>
+              <a:t> = c – m</a:t>
+            </a:r>
+          </a:p>
+          <a:p>
+            <a:r>
+              <a:rPr lang="en-GB" sz="2400" dirty="0"/>
+              <a:t>m</a:t>
+            </a:r>
+            <a:r>
+              <a:rPr lang="en-GB" sz="2400" dirty="0" smtClean="0"/>
+              <a:t>ask = 0 – borrow</a:t>
+            </a:r>
+            <a:br>
+              <a:rPr lang="en-GB" sz="2400" dirty="0" smtClean="0"/>
+            </a:br>
+            <a:r>
+              <a:rPr lang="en-GB" sz="2400" dirty="0" smtClean="0"/>
+              <a:t>mask = mask &amp; m</a:t>
+            </a:r>
+          </a:p>
+          <a:p>
+            <a:r>
+              <a:rPr lang="en-GB" sz="2400" dirty="0" smtClean="0"/>
+              <a:t>c = c + mask</a:t>
+            </a:r>
+            <a:endParaRPr lang="en-GB" sz="2400" dirty="0"/>
           </a:p>
         </p:txBody>
       </p:sp>
     </p:spTree>
     <p:extLst>
       <p:ext uri="{BB962C8B-B14F-4D97-AF65-F5344CB8AC3E}">
-        <p14:creationId xmlns:p14="http://schemas.microsoft.com/office/powerpoint/2010/main" val="1305159931"/>
+        <p14:creationId xmlns:p14="http://schemas.microsoft.com/office/powerpoint/2010/main" val="2310699902"/>
       </p:ext>
     </p:extLst>
   </p:cSld>
   <p:clrMapOvr>
     <a:masterClrMapping/>
   </p:clrMapOvr>
-  <p:timing>
-    <p:tnLst>
-      <p:par>
-        <p:cTn id="1" dur="indefinite" restart="never" nodeType="tmRoot"/>
-      </p:par>
-    </p:tnLst>
-  </p:timing>
 </p:sld>
 </file>
 
@@ -4198,7 +4291,7 @@
           <a:p>
             <a:r>
               <a:rPr lang="en-GB" dirty="0" smtClean="0"/>
-              <a:t>Conclusion</a:t>
+              <a:t>Modular Subtraction</a:t>
             </a:r>
             <a:endParaRPr lang="en-GB" dirty="0"/>
           </a:p>
@@ -4221,39 +4314,103 @@
           <a:p>
             <a:r>
               <a:rPr lang="en-GB" dirty="0" smtClean="0"/>
-              <a:t>Project was tedious to start</a:t>
-            </a:r>
-          </a:p>
-          <a:p>
-            <a:r>
-              <a:rPr lang="en-GB" dirty="0" smtClean="0"/>
-              <a:t>Hard time debugging</a:t>
-            </a:r>
-          </a:p>
-          <a:p>
-            <a:r>
-              <a:rPr lang="en-GB" dirty="0" smtClean="0"/>
-              <a:t>First hands-on experience</a:t>
-            </a:r>
-          </a:p>
-          <a:p>
-            <a:r>
-              <a:rPr lang="en-GB" dirty="0" smtClean="0"/>
-              <a:t>Great fun learning</a:t>
-            </a:r>
-          </a:p>
-          <a:p>
-            <a:pPr marL="0" indent="0">
-              <a:buNone/>
-            </a:pPr>
+              <a:t>Similar to modular addition</a:t>
+            </a:r>
+          </a:p>
+          <a:p>
+            <a:r>
+              <a:rPr lang="en-GB" dirty="0" smtClean="0"/>
+              <a:t>Hypothesis: a, b &lt; m</a:t>
+            </a:r>
+          </a:p>
+          <a:p>
             <a:endParaRPr lang="en-GB" dirty="0"/>
+          </a:p>
+        </p:txBody>
+      </p:sp>
+      <p:pic>
+        <p:nvPicPr>
+          <p:cNvPr id="4" name="Picture 3"/>
+          <p:cNvPicPr>
+            <a:picLocks noChangeAspect="1"/>
+          </p:cNvPicPr>
+          <p:nvPr/>
+        </p:nvPicPr>
+        <p:blipFill>
+          <a:blip r:embed="rId2">
+            <a:extLst>
+              <a:ext uri="{28A0092B-C50C-407E-A947-70E740481C1C}">
+                <a14:useLocalDpi xmlns:a14="http://schemas.microsoft.com/office/drawing/2010/main" val="0"/>
+              </a:ext>
+            </a:extLst>
+          </a:blip>
+          <a:stretch>
+            <a:fillRect/>
+          </a:stretch>
+        </p:blipFill>
+        <p:spPr>
+          <a:xfrm>
+            <a:off x="107504" y="2831813"/>
+            <a:ext cx="8964488" cy="3477507"/>
+          </a:xfrm>
+          <a:prstGeom prst="rect">
+            <a:avLst/>
+          </a:prstGeom>
+        </p:spPr>
+      </p:pic>
+      <p:sp>
+        <p:nvSpPr>
+          <p:cNvPr id="5" name="TextBox 4"/>
+          <p:cNvSpPr txBox="1"/>
+          <p:nvPr/>
+        </p:nvSpPr>
+        <p:spPr>
+          <a:xfrm>
+            <a:off x="5652120" y="4581128"/>
+            <a:ext cx="2490041" cy="1569660"/>
+          </a:xfrm>
+          <a:prstGeom prst="rect">
+            <a:avLst/>
+          </a:prstGeom>
+          <a:noFill/>
+        </p:spPr>
+        <p:txBody>
+          <a:bodyPr wrap="none" rtlCol="0">
+            <a:spAutoFit/>
+          </a:bodyPr>
+          <a:lstStyle/>
+          <a:p>
+            <a:r>
+              <a:rPr lang="en-GB" sz="2400" dirty="0" smtClean="0"/>
+              <a:t>c = a – b </a:t>
+            </a:r>
+          </a:p>
+          <a:p>
+            <a:r>
+              <a:rPr lang="en-GB" sz="2400" dirty="0" smtClean="0"/>
+              <a:t>mask = 0 – borrow</a:t>
+            </a:r>
+            <a:br>
+              <a:rPr lang="en-GB" sz="2400" dirty="0" smtClean="0"/>
+            </a:br>
+            <a:r>
+              <a:rPr lang="en-GB" sz="2400" dirty="0" smtClean="0"/>
+              <a:t>mask = mask &amp; m</a:t>
+            </a:r>
+          </a:p>
+          <a:p>
+            <a:r>
+              <a:rPr lang="en-GB" sz="2400" dirty="0" smtClean="0"/>
+              <a:t>c = c + mask</a:t>
+            </a:r>
+            <a:endParaRPr lang="en-GB" sz="2400" dirty="0"/>
           </a:p>
         </p:txBody>
       </p:sp>
     </p:spTree>
     <p:extLst>
       <p:ext uri="{BB962C8B-B14F-4D97-AF65-F5344CB8AC3E}">
-        <p14:creationId xmlns:p14="http://schemas.microsoft.com/office/powerpoint/2010/main" val="1222368615"/>
+        <p14:creationId xmlns:p14="http://schemas.microsoft.com/office/powerpoint/2010/main" val="1825120149"/>
       </p:ext>
     </p:extLst>
   </p:cSld>
@@ -4282,45 +4439,63 @@
       </p:grpSpPr>
       <p:sp>
         <p:nvSpPr>
-          <p:cNvPr id="2" name="TextBox 1"/>
-          <p:cNvSpPr txBox="1"/>
-          <p:nvPr/>
-        </p:nvSpPr>
-        <p:spPr>
-          <a:xfrm>
-            <a:off x="2854800" y="2852936"/>
-            <a:ext cx="3683381" cy="1015663"/>
-          </a:xfrm>
-          <a:prstGeom prst="rect">
-            <a:avLst/>
-          </a:prstGeom>
-          <a:noFill/>
-        </p:spPr>
-        <p:txBody>
-          <a:bodyPr wrap="none" rtlCol="0">
-            <a:spAutoFit/>
-          </a:bodyPr>
-          <a:lstStyle/>
-          <a:p>
-            <a:pPr algn="ctr"/>
-            <a:r>
-              <a:rPr lang="en-GB" sz="6000" dirty="0" smtClean="0"/>
-              <a:t>Questions?</a:t>
-            </a:r>
-            <a:endParaRPr lang="en-GB" sz="6000" dirty="0"/>
+          <p:cNvPr id="2" name="Title 1"/>
+          <p:cNvSpPr>
+            <a:spLocks noGrp="1"/>
+          </p:cNvSpPr>
+          <p:nvPr>
+            <p:ph type="title"/>
+          </p:nvPr>
+        </p:nvSpPr>
+        <p:spPr/>
+        <p:txBody>
+          <a:bodyPr/>
+          <a:lstStyle/>
+          <a:p>
+            <a:r>
+              <a:rPr lang="en-GB" dirty="0" smtClean="0"/>
+              <a:t>Benchmark Infrastructure</a:t>
+            </a:r>
+            <a:endParaRPr lang="en-GB" dirty="0"/>
+          </a:p>
+        </p:txBody>
+      </p:sp>
+      <p:sp>
+        <p:nvSpPr>
+          <p:cNvPr id="3" name="Content Placeholder 2"/>
+          <p:cNvSpPr>
+            <a:spLocks noGrp="1"/>
+          </p:cNvSpPr>
+          <p:nvPr>
+            <p:ph idx="1"/>
+          </p:nvPr>
+        </p:nvSpPr>
+        <p:spPr/>
+        <p:txBody>
+          <a:bodyPr/>
+          <a:lstStyle/>
+          <a:p>
+            <a:endParaRPr lang="en-GB" dirty="0"/>
           </a:p>
         </p:txBody>
       </p:sp>
     </p:spTree>
     <p:extLst>
       <p:ext uri="{BB962C8B-B14F-4D97-AF65-F5344CB8AC3E}">
-        <p14:creationId xmlns:p14="http://schemas.microsoft.com/office/powerpoint/2010/main" val="1859606178"/>
+        <p14:creationId xmlns:p14="http://schemas.microsoft.com/office/powerpoint/2010/main" val="1262940810"/>
       </p:ext>
     </p:extLst>
   </p:cSld>
   <p:clrMapOvr>
     <a:masterClrMapping/>
   </p:clrMapOvr>
+  <p:timing>
+    <p:tnLst>
+      <p:par>
+        <p:cTn id="1" dur="indefinite" restart="never" nodeType="tmRoot"/>
+      </p:par>
+    </p:tnLst>
+  </p:timing>
 </p:sld>
 </file>
 
@@ -4451,6 +4626,580 @@
             <p:ph type="title"/>
           </p:nvPr>
         </p:nvSpPr>
+        <p:spPr/>
+        <p:txBody>
+          <a:bodyPr/>
+          <a:lstStyle/>
+          <a:p>
+            <a:r>
+              <a:rPr lang="en-GB" dirty="0" smtClean="0"/>
+              <a:t>Benchmarks</a:t>
+            </a:r>
+            <a:endParaRPr lang="en-GB" dirty="0"/>
+          </a:p>
+        </p:txBody>
+      </p:sp>
+      <p:sp>
+        <p:nvSpPr>
+          <p:cNvPr id="3" name="Content Placeholder 2"/>
+          <p:cNvSpPr>
+            <a:spLocks noGrp="1"/>
+          </p:cNvSpPr>
+          <p:nvPr>
+            <p:ph idx="1"/>
+          </p:nvPr>
+        </p:nvSpPr>
+        <p:spPr/>
+        <p:txBody>
+          <a:bodyPr/>
+          <a:lstStyle/>
+          <a:p>
+            <a:r>
+              <a:rPr lang="en-GB" dirty="0" smtClean="0"/>
+              <a:t>Involve 10 consecutive executions of an operation.</a:t>
+            </a:r>
+          </a:p>
+          <a:p>
+            <a:r>
+              <a:rPr lang="en-GB" dirty="0" smtClean="0"/>
+              <a:t>Types of benchmarks</a:t>
+            </a:r>
+          </a:p>
+          <a:p>
+            <a:pPr lvl="1"/>
+            <a:r>
+              <a:rPr lang="en-GB" dirty="0" smtClean="0"/>
+              <a:t>Local vs. global memory access</a:t>
+            </a:r>
+          </a:p>
+          <a:p>
+            <a:pPr lvl="1"/>
+            <a:r>
+              <a:rPr lang="en-GB" dirty="0" smtClean="0"/>
+              <a:t>Importance of operand layout in memory</a:t>
+            </a:r>
+          </a:p>
+          <a:p>
+            <a:pPr lvl="1"/>
+            <a:r>
+              <a:rPr lang="en-GB" dirty="0" smtClean="0"/>
+              <a:t>Classical vs. </a:t>
+            </a:r>
+            <a:r>
+              <a:rPr lang="en-GB" dirty="0" err="1" smtClean="0"/>
+              <a:t>Karatsuba</a:t>
+            </a:r>
+            <a:r>
+              <a:rPr lang="en-GB" dirty="0" smtClean="0"/>
+              <a:t> multiplication</a:t>
+            </a:r>
+          </a:p>
+          <a:p>
+            <a:pPr lvl="1"/>
+            <a:r>
+              <a:rPr lang="en-GB" dirty="0" err="1" smtClean="0"/>
+              <a:t>Kepler</a:t>
+            </a:r>
+            <a:r>
+              <a:rPr lang="en-GB" dirty="0" smtClean="0"/>
+              <a:t> vs. Fermi</a:t>
+            </a:r>
+          </a:p>
+          <a:p>
+            <a:pPr lvl="1"/>
+            <a:r>
+              <a:rPr lang="en-GB" dirty="0" smtClean="0"/>
+              <a:t>Warp occupation</a:t>
+            </a:r>
+            <a:endParaRPr lang="en-GB" dirty="0"/>
+          </a:p>
+        </p:txBody>
+      </p:sp>
+    </p:spTree>
+    <p:extLst>
+      <p:ext uri="{BB962C8B-B14F-4D97-AF65-F5344CB8AC3E}">
+        <p14:creationId xmlns:p14="http://schemas.microsoft.com/office/powerpoint/2010/main" val="3123424124"/>
+      </p:ext>
+    </p:extLst>
+  </p:cSld>
+  <p:clrMapOvr>
+    <a:masterClrMapping/>
+  </p:clrMapOvr>
+  <p:timing>
+    <p:tnLst>
+      <p:par>
+        <p:cTn id="1" dur="indefinite" restart="never" nodeType="tmRoot"/>
+      </p:par>
+    </p:tnLst>
+  </p:timing>
+</p:sld>
+</file>
+
+<file path=ppt/slides/slide21.xml><?xml version="1.0" encoding="utf-8"?>
+<p:sld xmlns:a="http://schemas.openxmlformats.org/drawingml/2006/main" xmlns:r="http://schemas.openxmlformats.org/officeDocument/2006/relationships" xmlns:p="http://schemas.openxmlformats.org/presentationml/2006/main">
+  <p:cSld>
+    <p:spTree>
+      <p:nvGrpSpPr>
+        <p:cNvPr id="1" name=""/>
+        <p:cNvGrpSpPr/>
+        <p:nvPr/>
+      </p:nvGrpSpPr>
+      <p:grpSpPr>
+        <a:xfrm>
+          <a:off x="0" y="0"/>
+          <a:ext cx="0" cy="0"/>
+          <a:chOff x="0" y="0"/>
+          <a:chExt cx="0" cy="0"/>
+        </a:xfrm>
+      </p:grpSpPr>
+      <p:sp>
+        <p:nvSpPr>
+          <p:cNvPr id="2" name="Title 1"/>
+          <p:cNvSpPr>
+            <a:spLocks noGrp="1"/>
+          </p:cNvSpPr>
+          <p:nvPr>
+            <p:ph type="title"/>
+          </p:nvPr>
+        </p:nvSpPr>
+        <p:spPr/>
+        <p:txBody>
+          <a:bodyPr/>
+          <a:lstStyle/>
+          <a:p>
+            <a:r>
+              <a:rPr lang="en-GB" dirty="0" smtClean="0"/>
+              <a:t>Warp Occupation Results</a:t>
+            </a:r>
+            <a:endParaRPr lang="en-GB" dirty="0"/>
+          </a:p>
+        </p:txBody>
+      </p:sp>
+      <p:sp>
+        <p:nvSpPr>
+          <p:cNvPr id="5" name="Content Placeholder 4"/>
+          <p:cNvSpPr>
+            <a:spLocks noGrp="1"/>
+          </p:cNvSpPr>
+          <p:nvPr>
+            <p:ph idx="1"/>
+          </p:nvPr>
+        </p:nvSpPr>
+        <p:spPr/>
+        <p:txBody>
+          <a:bodyPr/>
+          <a:lstStyle/>
+          <a:p>
+            <a:r>
+              <a:rPr lang="en-GB" dirty="0" smtClean="0"/>
+              <a:t>Better to have less blocks, where more threads are used.</a:t>
+            </a:r>
+          </a:p>
+          <a:p>
+            <a:r>
+              <a:rPr lang="en-GB" dirty="0" smtClean="0"/>
+              <a:t>Must keep warp occupation full, at least 32 threads.</a:t>
+            </a:r>
+          </a:p>
+          <a:p>
+            <a:r>
+              <a:rPr lang="en-GB" dirty="0" smtClean="0"/>
+              <a:t>If not, then resources are wasted.</a:t>
+            </a:r>
+            <a:endParaRPr lang="en-GB" dirty="0"/>
+          </a:p>
+        </p:txBody>
+      </p:sp>
+    </p:spTree>
+    <p:extLst>
+      <p:ext uri="{BB962C8B-B14F-4D97-AF65-F5344CB8AC3E}">
+        <p14:creationId xmlns:p14="http://schemas.microsoft.com/office/powerpoint/2010/main" val="1675382120"/>
+      </p:ext>
+    </p:extLst>
+  </p:cSld>
+  <p:clrMapOvr>
+    <a:masterClrMapping/>
+  </p:clrMapOvr>
+  <p:timing>
+    <p:tnLst>
+      <p:par>
+        <p:cTn id="1" dur="indefinite" restart="never" nodeType="tmRoot"/>
+      </p:par>
+    </p:tnLst>
+  </p:timing>
+</p:sld>
+</file>
+
+<file path=ppt/slides/slide22.xml><?xml version="1.0" encoding="utf-8"?>
+<p:sld xmlns:a="http://schemas.openxmlformats.org/drawingml/2006/main" xmlns:r="http://schemas.openxmlformats.org/officeDocument/2006/relationships" xmlns:p="http://schemas.openxmlformats.org/presentationml/2006/main">
+  <p:cSld>
+    <p:spTree>
+      <p:nvGrpSpPr>
+        <p:cNvPr id="1" name=""/>
+        <p:cNvGrpSpPr/>
+        <p:nvPr/>
+      </p:nvGrpSpPr>
+      <p:grpSpPr>
+        <a:xfrm>
+          <a:off x="0" y="0"/>
+          <a:ext cx="0" cy="0"/>
+          <a:chOff x="0" y="0"/>
+          <a:chExt cx="0" cy="0"/>
+        </a:xfrm>
+      </p:grpSpPr>
+      <p:sp>
+        <p:nvSpPr>
+          <p:cNvPr id="2" name="Title 1"/>
+          <p:cNvSpPr>
+            <a:spLocks noGrp="1"/>
+          </p:cNvSpPr>
+          <p:nvPr>
+            <p:ph type="title"/>
+          </p:nvPr>
+        </p:nvSpPr>
+        <p:spPr/>
+        <p:txBody>
+          <a:bodyPr>
+            <a:normAutofit fontScale="90000"/>
+          </a:bodyPr>
+          <a:lstStyle/>
+          <a:p>
+            <a:r>
+              <a:rPr lang="en-GB" dirty="0" err="1" smtClean="0"/>
+              <a:t>Karatsuba</a:t>
+            </a:r>
+            <a:r>
+              <a:rPr lang="en-GB" dirty="0" smtClean="0"/>
+              <a:t> vs. Classical Multiplication and Warp Occupancy</a:t>
+            </a:r>
+            <a:endParaRPr lang="en-GB" dirty="0"/>
+          </a:p>
+        </p:txBody>
+      </p:sp>
+      <p:pic>
+        <p:nvPicPr>
+          <p:cNvPr id="4" name="Content Placeholder 3"/>
+          <p:cNvPicPr>
+            <a:picLocks noGrp="1" noChangeAspect="1"/>
+          </p:cNvPicPr>
+          <p:nvPr>
+            <p:ph idx="1"/>
+          </p:nvPr>
+        </p:nvPicPr>
+        <p:blipFill>
+          <a:blip r:embed="rId2">
+            <a:extLst>
+              <a:ext uri="{28A0092B-C50C-407E-A947-70E740481C1C}">
+                <a14:useLocalDpi xmlns:a14="http://schemas.microsoft.com/office/drawing/2010/main" val="0"/>
+              </a:ext>
+            </a:extLst>
+          </a:blip>
+          <a:stretch>
+            <a:fillRect/>
+          </a:stretch>
+        </p:blipFill>
+        <p:spPr>
+          <a:xfrm>
+            <a:off x="1427036" y="1600200"/>
+            <a:ext cx="6289928" cy="4525963"/>
+          </a:xfrm>
+        </p:spPr>
+      </p:pic>
+    </p:spTree>
+    <p:extLst>
+      <p:ext uri="{BB962C8B-B14F-4D97-AF65-F5344CB8AC3E}">
+        <p14:creationId xmlns:p14="http://schemas.microsoft.com/office/powerpoint/2010/main" val="467686000"/>
+      </p:ext>
+    </p:extLst>
+  </p:cSld>
+  <p:clrMapOvr>
+    <a:masterClrMapping/>
+  </p:clrMapOvr>
+</p:sld>
+</file>
+
+<file path=ppt/slides/slide23.xml><?xml version="1.0" encoding="utf-8"?>
+<p:sld xmlns:a="http://schemas.openxmlformats.org/drawingml/2006/main" xmlns:r="http://schemas.openxmlformats.org/officeDocument/2006/relationships" xmlns:p="http://schemas.openxmlformats.org/presentationml/2006/main">
+  <p:cSld>
+    <p:spTree>
+      <p:nvGrpSpPr>
+        <p:cNvPr id="1" name=""/>
+        <p:cNvGrpSpPr/>
+        <p:nvPr/>
+      </p:nvGrpSpPr>
+      <p:grpSpPr>
+        <a:xfrm>
+          <a:off x="0" y="0"/>
+          <a:ext cx="0" cy="0"/>
+          <a:chOff x="0" y="0"/>
+          <a:chExt cx="0" cy="0"/>
+        </a:xfrm>
+      </p:grpSpPr>
+      <p:sp>
+        <p:nvSpPr>
+          <p:cNvPr id="2" name="Title 1"/>
+          <p:cNvSpPr>
+            <a:spLocks noGrp="1"/>
+          </p:cNvSpPr>
+          <p:nvPr>
+            <p:ph type="title"/>
+          </p:nvPr>
+        </p:nvSpPr>
+        <p:spPr/>
+        <p:txBody>
+          <a:bodyPr/>
+          <a:lstStyle/>
+          <a:p>
+            <a:r>
+              <a:rPr lang="en-GB" dirty="0" smtClean="0"/>
+              <a:t>Operator verification</a:t>
+            </a:r>
+            <a:endParaRPr lang="en-GB" dirty="0"/>
+          </a:p>
+        </p:txBody>
+      </p:sp>
+      <p:sp>
+        <p:nvSpPr>
+          <p:cNvPr id="3" name="Content Placeholder 2"/>
+          <p:cNvSpPr>
+            <a:spLocks noGrp="1"/>
+          </p:cNvSpPr>
+          <p:nvPr>
+            <p:ph idx="1"/>
+          </p:nvPr>
+        </p:nvSpPr>
+        <p:spPr/>
+        <p:txBody>
+          <a:bodyPr/>
+          <a:lstStyle/>
+          <a:p>
+            <a:r>
+              <a:rPr lang="en-GB" dirty="0" smtClean="0"/>
+              <a:t>Like benchmark infrastructure</a:t>
+            </a:r>
+          </a:p>
+          <a:p>
+            <a:r>
+              <a:rPr lang="en-GB" dirty="0" smtClean="0"/>
+              <a:t>Operation results recovered from server</a:t>
+            </a:r>
+          </a:p>
+          <a:p>
+            <a:r>
+              <a:rPr lang="en-GB" dirty="0" smtClean="0"/>
+              <a:t>Checked for errors with GMP on host</a:t>
+            </a:r>
+            <a:endParaRPr lang="en-GB" dirty="0"/>
+          </a:p>
+        </p:txBody>
+      </p:sp>
+    </p:spTree>
+    <p:extLst>
+      <p:ext uri="{BB962C8B-B14F-4D97-AF65-F5344CB8AC3E}">
+        <p14:creationId xmlns:p14="http://schemas.microsoft.com/office/powerpoint/2010/main" val="1305159931"/>
+      </p:ext>
+    </p:extLst>
+  </p:cSld>
+  <p:clrMapOvr>
+    <a:masterClrMapping/>
+  </p:clrMapOvr>
+  <p:timing>
+    <p:tnLst>
+      <p:par>
+        <p:cTn id="1" dur="indefinite" restart="never" nodeType="tmRoot"/>
+      </p:par>
+    </p:tnLst>
+  </p:timing>
+</p:sld>
+</file>
+
+<file path=ppt/slides/slide24.xml><?xml version="1.0" encoding="utf-8"?>
+<p:sld xmlns:a="http://schemas.openxmlformats.org/drawingml/2006/main" xmlns:r="http://schemas.openxmlformats.org/officeDocument/2006/relationships" xmlns:p="http://schemas.openxmlformats.org/presentationml/2006/main">
+  <p:cSld>
+    <p:spTree>
+      <p:nvGrpSpPr>
+        <p:cNvPr id="1" name=""/>
+        <p:cNvGrpSpPr/>
+        <p:nvPr/>
+      </p:nvGrpSpPr>
+      <p:grpSpPr>
+        <a:xfrm>
+          <a:off x="0" y="0"/>
+          <a:ext cx="0" cy="0"/>
+          <a:chOff x="0" y="0"/>
+          <a:chExt cx="0" cy="0"/>
+        </a:xfrm>
+      </p:grpSpPr>
+      <p:sp>
+        <p:nvSpPr>
+          <p:cNvPr id="2" name="Title 1"/>
+          <p:cNvSpPr>
+            <a:spLocks noGrp="1"/>
+          </p:cNvSpPr>
+          <p:nvPr>
+            <p:ph type="title"/>
+          </p:nvPr>
+        </p:nvSpPr>
+        <p:spPr/>
+        <p:txBody>
+          <a:bodyPr/>
+          <a:lstStyle/>
+          <a:p>
+            <a:r>
+              <a:rPr lang="en-GB" dirty="0" smtClean="0"/>
+              <a:t>Conclusion</a:t>
+            </a:r>
+            <a:endParaRPr lang="en-GB" dirty="0"/>
+          </a:p>
+        </p:txBody>
+      </p:sp>
+      <p:sp>
+        <p:nvSpPr>
+          <p:cNvPr id="3" name="Content Placeholder 2"/>
+          <p:cNvSpPr>
+            <a:spLocks noGrp="1"/>
+          </p:cNvSpPr>
+          <p:nvPr>
+            <p:ph idx="1"/>
+          </p:nvPr>
+        </p:nvSpPr>
+        <p:spPr/>
+        <p:txBody>
+          <a:bodyPr/>
+          <a:lstStyle/>
+          <a:p>
+            <a:r>
+              <a:rPr lang="en-GB" dirty="0" smtClean="0"/>
+              <a:t>Project was tedious to start</a:t>
+            </a:r>
+          </a:p>
+          <a:p>
+            <a:r>
+              <a:rPr lang="en-GB" dirty="0" smtClean="0"/>
+              <a:t>Hard time debugging</a:t>
+            </a:r>
+          </a:p>
+          <a:p>
+            <a:r>
+              <a:rPr lang="en-GB" dirty="0" smtClean="0"/>
+              <a:t>First hands-on experience</a:t>
+            </a:r>
+          </a:p>
+          <a:p>
+            <a:r>
+              <a:rPr lang="en-GB" dirty="0" smtClean="0"/>
+              <a:t>Great fun learning</a:t>
+            </a:r>
+          </a:p>
+          <a:p>
+            <a:pPr marL="0" indent="0">
+              <a:buNone/>
+            </a:pPr>
+            <a:endParaRPr lang="en-GB" dirty="0"/>
+          </a:p>
+        </p:txBody>
+      </p:sp>
+    </p:spTree>
+    <p:extLst>
+      <p:ext uri="{BB962C8B-B14F-4D97-AF65-F5344CB8AC3E}">
+        <p14:creationId xmlns:p14="http://schemas.microsoft.com/office/powerpoint/2010/main" val="1222368615"/>
+      </p:ext>
+    </p:extLst>
+  </p:cSld>
+  <p:clrMapOvr>
+    <a:masterClrMapping/>
+  </p:clrMapOvr>
+</p:sld>
+</file>
+
+<file path=ppt/slides/slide25.xml><?xml version="1.0" encoding="utf-8"?>
+<p:sld xmlns:a="http://schemas.openxmlformats.org/drawingml/2006/main" xmlns:r="http://schemas.openxmlformats.org/officeDocument/2006/relationships" xmlns:p="http://schemas.openxmlformats.org/presentationml/2006/main">
+  <p:cSld>
+    <p:spTree>
+      <p:nvGrpSpPr>
+        <p:cNvPr id="1" name=""/>
+        <p:cNvGrpSpPr/>
+        <p:nvPr/>
+      </p:nvGrpSpPr>
+      <p:grpSpPr>
+        <a:xfrm>
+          <a:off x="0" y="0"/>
+          <a:ext cx="0" cy="0"/>
+          <a:chOff x="0" y="0"/>
+          <a:chExt cx="0" cy="0"/>
+        </a:xfrm>
+      </p:grpSpPr>
+      <p:sp>
+        <p:nvSpPr>
+          <p:cNvPr id="2" name="TextBox 1"/>
+          <p:cNvSpPr txBox="1"/>
+          <p:nvPr/>
+        </p:nvSpPr>
+        <p:spPr>
+          <a:xfrm>
+            <a:off x="2854800" y="2852936"/>
+            <a:ext cx="3683381" cy="1015663"/>
+          </a:xfrm>
+          <a:prstGeom prst="rect">
+            <a:avLst/>
+          </a:prstGeom>
+          <a:noFill/>
+        </p:spPr>
+        <p:txBody>
+          <a:bodyPr wrap="none" rtlCol="0">
+            <a:spAutoFit/>
+          </a:bodyPr>
+          <a:lstStyle/>
+          <a:p>
+            <a:pPr algn="ctr"/>
+            <a:r>
+              <a:rPr lang="en-GB" sz="6000" dirty="0" smtClean="0"/>
+              <a:t>Questions?</a:t>
+            </a:r>
+            <a:endParaRPr lang="en-GB" sz="6000" dirty="0"/>
+          </a:p>
+        </p:txBody>
+      </p:sp>
+    </p:spTree>
+    <p:extLst>
+      <p:ext uri="{BB962C8B-B14F-4D97-AF65-F5344CB8AC3E}">
+        <p14:creationId xmlns:p14="http://schemas.microsoft.com/office/powerpoint/2010/main" val="1859606178"/>
+      </p:ext>
+    </p:extLst>
+  </p:cSld>
+  <p:clrMapOvr>
+    <a:masterClrMapping/>
+  </p:clrMapOvr>
+</p:sld>
+</file>
+
+<file path=ppt/slides/slide26.xml><?xml version="1.0" encoding="utf-8"?>
+<p:sld xmlns:a="http://schemas.openxmlformats.org/drawingml/2006/main" xmlns:r="http://schemas.openxmlformats.org/officeDocument/2006/relationships" xmlns:p="http://schemas.openxmlformats.org/presentationml/2006/main">
+  <p:cSld>
+    <p:spTree>
+      <p:nvGrpSpPr>
+        <p:cNvPr id="1" name=""/>
+        <p:cNvGrpSpPr/>
+        <p:nvPr/>
+      </p:nvGrpSpPr>
+      <p:grpSpPr>
+        <a:xfrm>
+          <a:off x="0" y="0"/>
+          <a:ext cx="0" cy="0"/>
+          <a:chOff x="0" y="0"/>
+          <a:chExt cx="0" cy="0"/>
+        </a:xfrm>
+      </p:grpSpPr>
+      <p:sp>
+        <p:nvSpPr>
+          <p:cNvPr id="2" name="Title 1"/>
+          <p:cNvSpPr>
+            <a:spLocks noGrp="1"/>
+          </p:cNvSpPr>
+          <p:nvPr>
+            <p:ph type="title"/>
+          </p:nvPr>
+        </p:nvSpPr>
         <p:spPr>
           <a:xfrm>
             <a:off x="467544" y="2924944"/>
@@ -4642,8 +5391,13 @@
           <a:p>
             <a:r>
               <a:rPr lang="en-GB" dirty="0" smtClean="0"/>
-              <a:t>Learning GPU programming through experimentation</a:t>
-            </a:r>
+              <a:t>Learning GPU programming through </a:t>
+            </a:r>
+            <a:r>
+              <a:rPr lang="en-GB" dirty="0" smtClean="0"/>
+              <a:t>experimentation to see what works best</a:t>
+            </a:r>
+            <a:endParaRPr lang="en-GB" dirty="0" smtClean="0"/>
           </a:p>
           <a:p>
             <a:r>
@@ -5004,8 +5758,13 @@
             <a:pPr lvl="1"/>
             <a:r>
               <a:rPr lang="en-GB" dirty="0" smtClean="0"/>
-              <a:t>Not hidden behind a compiler: we know exactly what's going on.</a:t>
-            </a:r>
+              <a:t>Not hidden behind a compiler: we know exactly what's going </a:t>
+            </a:r>
+            <a:r>
+              <a:rPr lang="en-GB" dirty="0" smtClean="0"/>
+              <a:t>on</a:t>
+            </a:r>
+            <a:endParaRPr lang="en-GB" dirty="0" smtClean="0"/>
           </a:p>
           <a:p>
             <a:r>
@@ -5212,17 +5971,13 @@
           <a:bodyPr/>
           <a:lstStyle/>
           <a:p>
-            <a:r>
-              <a:rPr lang="en-GB" dirty="0" smtClean="0"/>
-              <a:t>Our Framework</a:t>
-            </a:r>
             <a:endParaRPr lang="en-GB" dirty="0"/>
           </a:p>
         </p:txBody>
       </p:sp>
       <p:sp>
         <p:nvSpPr>
-          <p:cNvPr id="3" name="Content Placeholder 2"/>
+          <p:cNvPr id="5" name="Content Placeholder 4"/>
           <p:cNvSpPr>
             <a:spLocks noGrp="1"/>
           </p:cNvSpPr>
@@ -5235,27 +5990,20 @@
           <a:bodyPr/>
           <a:lstStyle/>
           <a:p>
-            <a:endParaRPr lang="en-GB" dirty="0"/>
+            <a:endParaRPr lang="en-GB"/>
           </a:p>
         </p:txBody>
       </p:sp>
     </p:spTree>
     <p:extLst>
       <p:ext uri="{BB962C8B-B14F-4D97-AF65-F5344CB8AC3E}">
-        <p14:creationId xmlns:p14="http://schemas.microsoft.com/office/powerpoint/2010/main" val="2036134894"/>
+        <p14:creationId xmlns:p14="http://schemas.microsoft.com/office/powerpoint/2010/main" val="4160423180"/>
       </p:ext>
     </p:extLst>
   </p:cSld>
   <p:clrMapOvr>
     <a:masterClrMapping/>
   </p:clrMapOvr>
-  <p:timing>
-    <p:tnLst>
-      <p:par>
-        <p:cTn id="1" dur="indefinite" restart="never" nodeType="tmRoot"/>
-      </p:par>
-    </p:tnLst>
-  </p:timing>
 </p:sld>
 </file>
 

</xml_diff>